<commit_message>
added pptx and pdf of presentation
</commit_message>
<xml_diff>
--- a/presentation/kp-semi-hasani-prensentation.pptx
+++ b/presentation/kp-semi-hasani-prensentation.pptx
@@ -1,9 +1,12 @@
 
 <file path=ppt/presentation.xml><?xml version="1.0" encoding="utf-8"?>
-<p:presentation xmlns:a="http://schemas.openxmlformats.org/drawingml/2006/main" xmlns:r="http://schemas.openxmlformats.org/officeDocument/2006/relationships" xmlns:p="http://schemas.openxmlformats.org/presentationml/2006/main" saveSubsetFonts="1">
+<p:presentation xmlns:a="http://schemas.openxmlformats.org/drawingml/2006/main" xmlns:r="http://schemas.openxmlformats.org/officeDocument/2006/relationships" xmlns:p="http://schemas.openxmlformats.org/presentationml/2006/main" showSpecialPlsOnTitleSld="0" saveSubsetFonts="1">
   <p:sldMasterIdLst>
     <p:sldMasterId id="2147483660" r:id="rId1"/>
   </p:sldMasterIdLst>
+  <p:notesMasterIdLst>
+    <p:notesMasterId r:id="rId14"/>
+  </p:notesMasterIdLst>
   <p:sldIdLst>
     <p:sldId id="256" r:id="rId2"/>
     <p:sldId id="269" r:id="rId3"/>
@@ -15,9 +18,8 @@
     <p:sldId id="262" r:id="rId9"/>
     <p:sldId id="275" r:id="rId10"/>
     <p:sldId id="276" r:id="rId11"/>
-    <p:sldId id="272" r:id="rId12"/>
-    <p:sldId id="258" r:id="rId13"/>
-    <p:sldId id="277" r:id="rId14"/>
+    <p:sldId id="258" r:id="rId12"/>
+    <p:sldId id="277" r:id="rId13"/>
   </p:sldIdLst>
   <p:sldSz cx="12192000" cy="6858000"/>
   <p:notesSz cx="6858000" cy="9144000"/>
@@ -124,6 +126,355 @@
 </p:presentation>
 </file>
 
+<file path=ppt/notesMasters/notesMaster1.xml><?xml version="1.0" encoding="utf-8"?>
+<p:notesMaster xmlns:a="http://schemas.openxmlformats.org/drawingml/2006/main" xmlns:r="http://schemas.openxmlformats.org/officeDocument/2006/relationships" xmlns:p="http://schemas.openxmlformats.org/presentationml/2006/main">
+  <p:cSld>
+    <p:bg>
+      <p:bgRef idx="1001">
+        <a:schemeClr val="bg1"/>
+      </p:bgRef>
+    </p:bg>
+    <p:spTree>
+      <p:nvGrpSpPr>
+        <p:cNvPr id="1" name=""/>
+        <p:cNvGrpSpPr/>
+        <p:nvPr/>
+      </p:nvGrpSpPr>
+      <p:grpSpPr>
+        <a:xfrm>
+          <a:off x="0" y="0"/>
+          <a:ext cx="0" cy="0"/>
+          <a:chOff x="0" y="0"/>
+          <a:chExt cx="0" cy="0"/>
+        </a:xfrm>
+      </p:grpSpPr>
+      <p:sp>
+        <p:nvSpPr>
+          <p:cNvPr id="2" name="Kopfzeilenplatzhalter 1"/>
+          <p:cNvSpPr>
+            <a:spLocks noGrp="1"/>
+          </p:cNvSpPr>
+          <p:nvPr>
+            <p:ph type="hdr" sz="quarter"/>
+          </p:nvPr>
+        </p:nvSpPr>
+        <p:spPr>
+          <a:xfrm>
+            <a:off x="0" y="0"/>
+            <a:ext cx="2971800" cy="458788"/>
+          </a:xfrm>
+          <a:prstGeom prst="rect">
+            <a:avLst/>
+          </a:prstGeom>
+        </p:spPr>
+        <p:txBody>
+          <a:bodyPr vert="horz" lIns="91440" tIns="45720" rIns="91440" bIns="45720" rtlCol="0"/>
+          <a:lstStyle>
+            <a:lvl1pPr algn="l">
+              <a:defRPr sz="1200"/>
+            </a:lvl1pPr>
+          </a:lstStyle>
+          <a:p>
+            <a:endParaRPr lang="de-DE"/>
+          </a:p>
+        </p:txBody>
+      </p:sp>
+      <p:sp>
+        <p:nvSpPr>
+          <p:cNvPr id="3" name="Datumsplatzhalter 2"/>
+          <p:cNvSpPr>
+            <a:spLocks noGrp="1"/>
+          </p:cNvSpPr>
+          <p:nvPr>
+            <p:ph type="dt" idx="1"/>
+          </p:nvPr>
+        </p:nvSpPr>
+        <p:spPr>
+          <a:xfrm>
+            <a:off x="3884613" y="0"/>
+            <a:ext cx="2971800" cy="458788"/>
+          </a:xfrm>
+          <a:prstGeom prst="rect">
+            <a:avLst/>
+          </a:prstGeom>
+        </p:spPr>
+        <p:txBody>
+          <a:bodyPr vert="horz" lIns="91440" tIns="45720" rIns="91440" bIns="45720" rtlCol="0"/>
+          <a:lstStyle>
+            <a:lvl1pPr algn="r">
+              <a:defRPr sz="1200"/>
+            </a:lvl1pPr>
+          </a:lstStyle>
+          <a:p>
+            <a:fld id="{EFAE7761-78A9-7346-8387-177BF15C1C05}" type="datetimeFigureOut">
+              <a:rPr lang="de-DE" smtClean="0"/>
+              <a:t>13.01.25</a:t>
+            </a:fld>
+            <a:endParaRPr lang="de-DE"/>
+          </a:p>
+        </p:txBody>
+      </p:sp>
+      <p:sp>
+        <p:nvSpPr>
+          <p:cNvPr id="4" name="Folienbildplatzhalter 3"/>
+          <p:cNvSpPr>
+            <a:spLocks noGrp="1" noRot="1" noChangeAspect="1"/>
+          </p:cNvSpPr>
+          <p:nvPr>
+            <p:ph type="sldImg" idx="2"/>
+          </p:nvPr>
+        </p:nvSpPr>
+        <p:spPr>
+          <a:xfrm>
+            <a:off x="685800" y="1143000"/>
+            <a:ext cx="5486400" cy="3086100"/>
+          </a:xfrm>
+          <a:prstGeom prst="rect">
+            <a:avLst/>
+          </a:prstGeom>
+          <a:noFill/>
+          <a:ln w="12700">
+            <a:solidFill>
+              <a:prstClr val="black"/>
+            </a:solidFill>
+          </a:ln>
+        </p:spPr>
+        <p:txBody>
+          <a:bodyPr vert="horz" lIns="91440" tIns="45720" rIns="91440" bIns="45720" rtlCol="0" anchor="ctr"/>
+          <a:lstStyle/>
+          <a:p>
+            <a:endParaRPr lang="de-DE"/>
+          </a:p>
+        </p:txBody>
+      </p:sp>
+      <p:sp>
+        <p:nvSpPr>
+          <p:cNvPr id="5" name="Notizenplatzhalter 4"/>
+          <p:cNvSpPr>
+            <a:spLocks noGrp="1"/>
+          </p:cNvSpPr>
+          <p:nvPr>
+            <p:ph type="body" sz="quarter" idx="3"/>
+          </p:nvPr>
+        </p:nvSpPr>
+        <p:spPr>
+          <a:xfrm>
+            <a:off x="685800" y="4400550"/>
+            <a:ext cx="5486400" cy="3600450"/>
+          </a:xfrm>
+          <a:prstGeom prst="rect">
+            <a:avLst/>
+          </a:prstGeom>
+        </p:spPr>
+        <p:txBody>
+          <a:bodyPr vert="horz" lIns="91440" tIns="45720" rIns="91440" bIns="45720" rtlCol="0"/>
+          <a:lstStyle/>
+          <a:p>
+            <a:pPr lvl="0"/>
+            <a:r>
+              <a:rPr lang="de-DE"/>
+              <a:t>Mastertextformat bearbeiten</a:t>
+            </a:r>
+          </a:p>
+          <a:p>
+            <a:pPr lvl="1"/>
+            <a:r>
+              <a:rPr lang="de-DE"/>
+              <a:t>Zweite Ebene</a:t>
+            </a:r>
+          </a:p>
+          <a:p>
+            <a:pPr lvl="2"/>
+            <a:r>
+              <a:rPr lang="de-DE"/>
+              <a:t>Dritte Ebene</a:t>
+            </a:r>
+          </a:p>
+          <a:p>
+            <a:pPr lvl="3"/>
+            <a:r>
+              <a:rPr lang="de-DE"/>
+              <a:t>Vierte Ebene</a:t>
+            </a:r>
+          </a:p>
+          <a:p>
+            <a:pPr lvl="4"/>
+            <a:r>
+              <a:rPr lang="de-DE"/>
+              <a:t>Fünfte Ebene</a:t>
+            </a:r>
+          </a:p>
+        </p:txBody>
+      </p:sp>
+      <p:sp>
+        <p:nvSpPr>
+          <p:cNvPr id="6" name="Fußzeilenplatzhalter 5"/>
+          <p:cNvSpPr>
+            <a:spLocks noGrp="1"/>
+          </p:cNvSpPr>
+          <p:nvPr>
+            <p:ph type="ftr" sz="quarter" idx="4"/>
+          </p:nvPr>
+        </p:nvSpPr>
+        <p:spPr>
+          <a:xfrm>
+            <a:off x="0" y="8685213"/>
+            <a:ext cx="2971800" cy="458787"/>
+          </a:xfrm>
+          <a:prstGeom prst="rect">
+            <a:avLst/>
+          </a:prstGeom>
+        </p:spPr>
+        <p:txBody>
+          <a:bodyPr vert="horz" lIns="91440" tIns="45720" rIns="91440" bIns="45720" rtlCol="0" anchor="b"/>
+          <a:lstStyle>
+            <a:lvl1pPr algn="l">
+              <a:defRPr sz="1200"/>
+            </a:lvl1pPr>
+          </a:lstStyle>
+          <a:p>
+            <a:endParaRPr lang="de-DE"/>
+          </a:p>
+        </p:txBody>
+      </p:sp>
+      <p:sp>
+        <p:nvSpPr>
+          <p:cNvPr id="7" name="Foliennummernplatzhalter 6"/>
+          <p:cNvSpPr>
+            <a:spLocks noGrp="1"/>
+          </p:cNvSpPr>
+          <p:nvPr>
+            <p:ph type="sldNum" sz="quarter" idx="5"/>
+          </p:nvPr>
+        </p:nvSpPr>
+        <p:spPr>
+          <a:xfrm>
+            <a:off x="3884613" y="8685213"/>
+            <a:ext cx="2971800" cy="458787"/>
+          </a:xfrm>
+          <a:prstGeom prst="rect">
+            <a:avLst/>
+          </a:prstGeom>
+        </p:spPr>
+        <p:txBody>
+          <a:bodyPr vert="horz" lIns="91440" tIns="45720" rIns="91440" bIns="45720" rtlCol="0" anchor="b"/>
+          <a:lstStyle>
+            <a:lvl1pPr algn="r">
+              <a:defRPr sz="1200"/>
+            </a:lvl1pPr>
+          </a:lstStyle>
+          <a:p>
+            <a:fld id="{64716100-DC5A-384D-A1BD-E6EBE4D6F7F8}" type="slidenum">
+              <a:rPr lang="de-DE" smtClean="0"/>
+              <a:t>‹Nr.›</a:t>
+            </a:fld>
+            <a:endParaRPr lang="de-DE"/>
+          </a:p>
+        </p:txBody>
+      </p:sp>
+    </p:spTree>
+    <p:extLst>
+      <p:ext uri="{BB962C8B-B14F-4D97-AF65-F5344CB8AC3E}">
+        <p14:creationId xmlns:p14="http://schemas.microsoft.com/office/powerpoint/2010/main" val="2596420894"/>
+      </p:ext>
+    </p:extLst>
+  </p:cSld>
+  <p:clrMap bg1="lt1" tx1="dk1" bg2="lt2" tx2="dk2" accent1="accent1" accent2="accent2" accent3="accent3" accent4="accent4" accent5="accent5" accent6="accent6" hlink="hlink" folHlink="folHlink"/>
+  <p:notesStyle>
+    <a:lvl1pPr marL="0" algn="l" defTabSz="914400" rtl="0" eaLnBrk="1" latinLnBrk="0" hangingPunct="1">
+      <a:defRPr sz="1200" kern="1200">
+        <a:solidFill>
+          <a:schemeClr val="tx1"/>
+        </a:solidFill>
+        <a:latin typeface="+mn-lt"/>
+        <a:ea typeface="+mn-ea"/>
+        <a:cs typeface="+mn-cs"/>
+      </a:defRPr>
+    </a:lvl1pPr>
+    <a:lvl2pPr marL="457200" algn="l" defTabSz="914400" rtl="0" eaLnBrk="1" latinLnBrk="0" hangingPunct="1">
+      <a:defRPr sz="1200" kern="1200">
+        <a:solidFill>
+          <a:schemeClr val="tx1"/>
+        </a:solidFill>
+        <a:latin typeface="+mn-lt"/>
+        <a:ea typeface="+mn-ea"/>
+        <a:cs typeface="+mn-cs"/>
+      </a:defRPr>
+    </a:lvl2pPr>
+    <a:lvl3pPr marL="914400" algn="l" defTabSz="914400" rtl="0" eaLnBrk="1" latinLnBrk="0" hangingPunct="1">
+      <a:defRPr sz="1200" kern="1200">
+        <a:solidFill>
+          <a:schemeClr val="tx1"/>
+        </a:solidFill>
+        <a:latin typeface="+mn-lt"/>
+        <a:ea typeface="+mn-ea"/>
+        <a:cs typeface="+mn-cs"/>
+      </a:defRPr>
+    </a:lvl3pPr>
+    <a:lvl4pPr marL="1371600" algn="l" defTabSz="914400" rtl="0" eaLnBrk="1" latinLnBrk="0" hangingPunct="1">
+      <a:defRPr sz="1200" kern="1200">
+        <a:solidFill>
+          <a:schemeClr val="tx1"/>
+        </a:solidFill>
+        <a:latin typeface="+mn-lt"/>
+        <a:ea typeface="+mn-ea"/>
+        <a:cs typeface="+mn-cs"/>
+      </a:defRPr>
+    </a:lvl4pPr>
+    <a:lvl5pPr marL="1828800" algn="l" defTabSz="914400" rtl="0" eaLnBrk="1" latinLnBrk="0" hangingPunct="1">
+      <a:defRPr sz="1200" kern="1200">
+        <a:solidFill>
+          <a:schemeClr val="tx1"/>
+        </a:solidFill>
+        <a:latin typeface="+mn-lt"/>
+        <a:ea typeface="+mn-ea"/>
+        <a:cs typeface="+mn-cs"/>
+      </a:defRPr>
+    </a:lvl5pPr>
+    <a:lvl6pPr marL="2286000" algn="l" defTabSz="914400" rtl="0" eaLnBrk="1" latinLnBrk="0" hangingPunct="1">
+      <a:defRPr sz="1200" kern="1200">
+        <a:solidFill>
+          <a:schemeClr val="tx1"/>
+        </a:solidFill>
+        <a:latin typeface="+mn-lt"/>
+        <a:ea typeface="+mn-ea"/>
+        <a:cs typeface="+mn-cs"/>
+      </a:defRPr>
+    </a:lvl6pPr>
+    <a:lvl7pPr marL="2743200" algn="l" defTabSz="914400" rtl="0" eaLnBrk="1" latinLnBrk="0" hangingPunct="1">
+      <a:defRPr sz="1200" kern="1200">
+        <a:solidFill>
+          <a:schemeClr val="tx1"/>
+        </a:solidFill>
+        <a:latin typeface="+mn-lt"/>
+        <a:ea typeface="+mn-ea"/>
+        <a:cs typeface="+mn-cs"/>
+      </a:defRPr>
+    </a:lvl7pPr>
+    <a:lvl8pPr marL="3200400" algn="l" defTabSz="914400" rtl="0" eaLnBrk="1" latinLnBrk="0" hangingPunct="1">
+      <a:defRPr sz="1200" kern="1200">
+        <a:solidFill>
+          <a:schemeClr val="tx1"/>
+        </a:solidFill>
+        <a:latin typeface="+mn-lt"/>
+        <a:ea typeface="+mn-ea"/>
+        <a:cs typeface="+mn-cs"/>
+      </a:defRPr>
+    </a:lvl8pPr>
+    <a:lvl9pPr marL="3657600" algn="l" defTabSz="914400" rtl="0" eaLnBrk="1" latinLnBrk="0" hangingPunct="1">
+      <a:defRPr sz="1200" kern="1200">
+        <a:solidFill>
+          <a:schemeClr val="tx1"/>
+        </a:solidFill>
+        <a:latin typeface="+mn-lt"/>
+        <a:ea typeface="+mn-ea"/>
+        <a:cs typeface="+mn-cs"/>
+      </a:defRPr>
+    </a:lvl9pPr>
+  </p:notesStyle>
+</p:notesMaster>
+</file>
+
 <file path=ppt/slideLayouts/slideLayout1.xml><?xml version="1.0" encoding="utf-8"?>
 <p:sldLayout xmlns:a="http://schemas.openxmlformats.org/drawingml/2006/main" xmlns:r="http://schemas.openxmlformats.org/officeDocument/2006/relationships" xmlns:p="http://schemas.openxmlformats.org/presentationml/2006/main" showMasterSp="0" type="title" preserve="1">
   <p:cSld name="Titelfolie">
@@ -346,9 +697,9 @@
           <a:bodyPr/>
           <a:lstStyle/>
           <a:p>
-            <a:fld id="{98D7FA08-21FD-43F7-BBD7-51C00D5513AF}" type="datetimeFigureOut">
+            <a:fld id="{C824543C-D486-8049-832B-A1623CEEE347}" type="datetime1">
               <a:rPr lang="de-DE" smtClean="0"/>
-              <a:t>12.01.25</a:t>
+              <a:t>13.01.25</a:t>
             </a:fld>
             <a:endParaRPr lang="de-DE"/>
           </a:p>
@@ -516,9 +867,9 @@
           <a:bodyPr/>
           <a:lstStyle/>
           <a:p>
-            <a:fld id="{98D7FA08-21FD-43F7-BBD7-51C00D5513AF}" type="datetimeFigureOut">
+            <a:fld id="{E1D92AAB-8344-1B49-AA09-BBE029867983}" type="datetime1">
               <a:rPr lang="de-DE" smtClean="0"/>
-              <a:t>12.01.25</a:t>
+              <a:t>13.01.25</a:t>
             </a:fld>
             <a:endParaRPr lang="de-DE"/>
           </a:p>
@@ -696,9 +1047,9 @@
           <a:bodyPr/>
           <a:lstStyle/>
           <a:p>
-            <a:fld id="{98D7FA08-21FD-43F7-BBD7-51C00D5513AF}" type="datetimeFigureOut">
+            <a:fld id="{617DD160-0DC9-0340-BBE1-31064A90BB31}" type="datetime1">
               <a:rPr lang="de-DE" smtClean="0"/>
-              <a:t>12.01.25</a:t>
+              <a:t>13.01.25</a:t>
             </a:fld>
             <a:endParaRPr lang="de-DE"/>
           </a:p>
@@ -866,9 +1217,9 @@
           <a:bodyPr/>
           <a:lstStyle/>
           <a:p>
-            <a:fld id="{98D7FA08-21FD-43F7-BBD7-51C00D5513AF}" type="datetimeFigureOut">
+            <a:fld id="{3AA65087-ECBB-6648-9F7C-B59F264B54A5}" type="datetime1">
               <a:rPr lang="de-DE" smtClean="0"/>
-              <a:t>12.01.25</a:t>
+              <a:t>13.01.25</a:t>
             </a:fld>
             <a:endParaRPr lang="de-DE"/>
           </a:p>
@@ -1124,9 +1475,9 @@
           <a:bodyPr/>
           <a:lstStyle/>
           <a:p>
-            <a:fld id="{98D7FA08-21FD-43F7-BBD7-51C00D5513AF}" type="datetimeFigureOut">
+            <a:fld id="{93853013-BBB8-1847-9655-EA0EFCC45E79}" type="datetime1">
               <a:rPr lang="de-DE" smtClean="0"/>
-              <a:t>12.01.25</a:t>
+              <a:t>13.01.25</a:t>
             </a:fld>
             <a:endParaRPr lang="de-DE"/>
           </a:p>
@@ -1412,9 +1763,9 @@
           <a:bodyPr/>
           <a:lstStyle/>
           <a:p>
-            <a:fld id="{98D7FA08-21FD-43F7-BBD7-51C00D5513AF}" type="datetimeFigureOut">
+            <a:fld id="{12A3B511-C40C-234C-B391-D7975B1C1B5E}" type="datetime1">
               <a:rPr lang="de-DE" smtClean="0"/>
-              <a:t>12.01.25</a:t>
+              <a:t>13.01.25</a:t>
             </a:fld>
             <a:endParaRPr lang="de-DE"/>
           </a:p>
@@ -1854,9 +2205,9 @@
           <a:bodyPr/>
           <a:lstStyle/>
           <a:p>
-            <a:fld id="{98D7FA08-21FD-43F7-BBD7-51C00D5513AF}" type="datetimeFigureOut">
+            <a:fld id="{4ACD658A-C630-2448-8539-3041A3EB2A92}" type="datetime1">
               <a:rPr lang="de-DE" smtClean="0"/>
-              <a:t>12.01.25</a:t>
+              <a:t>13.01.25</a:t>
             </a:fld>
             <a:endParaRPr lang="de-DE"/>
           </a:p>
@@ -1972,9 +2323,9 @@
           <a:bodyPr/>
           <a:lstStyle/>
           <a:p>
-            <a:fld id="{98D7FA08-21FD-43F7-BBD7-51C00D5513AF}" type="datetimeFigureOut">
+            <a:fld id="{0DD2025A-8808-9E42-A19A-69223605F1C2}" type="datetime1">
               <a:rPr lang="de-DE" smtClean="0"/>
-              <a:t>12.01.25</a:t>
+              <a:t>13.01.25</a:t>
             </a:fld>
             <a:endParaRPr lang="de-DE"/>
           </a:p>
@@ -2067,9 +2418,9 @@
           <a:bodyPr/>
           <a:lstStyle/>
           <a:p>
-            <a:fld id="{98D7FA08-21FD-43F7-BBD7-51C00D5513AF}" type="datetimeFigureOut">
+            <a:fld id="{B7BE83A3-1221-F94D-9668-752F90DE838A}" type="datetime1">
               <a:rPr lang="de-DE" smtClean="0"/>
-              <a:t>12.01.25</a:t>
+              <a:t>13.01.25</a:t>
             </a:fld>
             <a:endParaRPr lang="de-DE"/>
           </a:p>
@@ -2355,9 +2706,9 @@
           <a:bodyPr/>
           <a:lstStyle/>
           <a:p>
-            <a:fld id="{98D7FA08-21FD-43F7-BBD7-51C00D5513AF}" type="datetimeFigureOut">
+            <a:fld id="{67C4ACF3-0771-314A-AC37-19C5C528F05E}" type="datetime1">
               <a:rPr lang="de-DE" smtClean="0"/>
-              <a:t>12.01.25</a:t>
+              <a:t>13.01.25</a:t>
             </a:fld>
             <a:endParaRPr lang="de-DE"/>
           </a:p>
@@ -2628,9 +2979,9 @@
           <a:bodyPr/>
           <a:lstStyle/>
           <a:p>
-            <a:fld id="{98D7FA08-21FD-43F7-BBD7-51C00D5513AF}" type="datetimeFigureOut">
+            <a:fld id="{2B64CA5B-AB6D-E24E-9B40-1ADA538082EB}" type="datetime1">
               <a:rPr lang="de-DE" smtClean="0"/>
-              <a:t>12.01.25</a:t>
+              <a:t>13.01.25</a:t>
             </a:fld>
             <a:endParaRPr lang="de-DE"/>
           </a:p>
@@ -2925,9 +3276,9 @@
             </a:lvl1pPr>
           </a:lstStyle>
           <a:p>
-            <a:fld id="{98D7FA08-21FD-43F7-BBD7-51C00D5513AF}" type="datetimeFigureOut">
+            <a:fld id="{615C3CD2-8CA7-B947-BBF2-E36D59F7459B}" type="datetime1">
               <a:rPr lang="de-DE" smtClean="0"/>
-              <a:t>12.01.25</a:t>
+              <a:t>13.01.25</a:t>
             </a:fld>
             <a:endParaRPr lang="de-DE"/>
           </a:p>
@@ -3031,6 +3382,7 @@
     <p:sldLayoutId id="2147483670" r:id="rId10"/>
     <p:sldLayoutId id="2147483671" r:id="rId11"/>
   </p:sldLayoutIdLst>
+  <p:hf hdr="0" ftr="0" dt="0"/>
   <p:txStyles>
     <p:titleStyle>
       <a:lvl1pPr algn="l" defTabSz="914400" rtl="0" eaLnBrk="1" latinLnBrk="0" hangingPunct="1">
@@ -3828,13 +4180,21 @@
           <a:p>
             <a:r>
               <a:rPr lang="de-DE" sz="2200" dirty="0"/>
-              <a:t>Statisch typisiert, sicher und weniger flexibel</a:t>
+              <a:t>Statisch typisiert, sicher </a:t>
             </a:r>
           </a:p>
           <a:p>
             <a:r>
               <a:rPr lang="de-DE" sz="2200" dirty="0"/>
-              <a:t>Klare Trennung zwischen Strukturen – keine Zwei-Wege-Beziehung</a:t>
+              <a:t>Klare Trennung zwischen Strukturen – keine </a:t>
+            </a:r>
+            <a:r>
+              <a:rPr lang="de-DE" sz="2200" dirty="0" err="1"/>
+              <a:t>Two</a:t>
+            </a:r>
+            <a:r>
+              <a:rPr lang="de-DE" sz="2200" dirty="0"/>
+              <a:t>-Way-Verbindung</a:t>
             </a:r>
           </a:p>
           <a:p>
@@ -3872,7 +4232,7 @@
           <a:p>
             <a:r>
               <a:rPr lang="de-DE" sz="2200" dirty="0"/>
-              <a:t>Dynamisch und flexibel – Methoden und Felder können zur Laufzeit geändert werden</a:t>
+              <a:t>Dynamisch und flexibel </a:t>
             </a:r>
           </a:p>
           <a:p>
@@ -3899,6 +4259,35 @@
           </a:p>
           <a:p>
             <a:endParaRPr lang="de-DE" dirty="0"/>
+          </a:p>
+        </p:txBody>
+      </p:sp>
+      <p:sp>
+        <p:nvSpPr>
+          <p:cNvPr id="4" name="Foliennummernplatzhalter 3">
+            <a:extLst>
+              <a:ext uri="{FF2B5EF4-FFF2-40B4-BE49-F238E27FC236}">
+                <a16:creationId xmlns:a16="http://schemas.microsoft.com/office/drawing/2014/main" id="{A4D4509B-1CC1-08D4-350F-42229AF6FA71}"/>
+              </a:ext>
+            </a:extLst>
+          </p:cNvPr>
+          <p:cNvSpPr>
+            <a:spLocks noGrp="1"/>
+          </p:cNvSpPr>
+          <p:nvPr>
+            <p:ph type="sldNum" sz="quarter" idx="12"/>
+          </p:nvPr>
+        </p:nvSpPr>
+        <p:spPr/>
+        <p:txBody>
+          <a:bodyPr/>
+          <a:lstStyle/>
+          <a:p>
+            <a:fld id="{34F138AB-EE92-463A-901F-60A2CAACE736}" type="slidenum">
+              <a:rPr lang="de-DE" smtClean="0"/>
+              <a:t>10</a:t>
+            </a:fld>
+            <a:endParaRPr lang="de-DE"/>
           </a:p>
         </p:txBody>
       </p:sp>
@@ -3916,194 +4305,6 @@
 </file>
 
 <file path=ppt/slides/slide11.xml><?xml version="1.0" encoding="utf-8"?>
-<p:sld xmlns:a="http://schemas.openxmlformats.org/drawingml/2006/main" xmlns:r="http://schemas.openxmlformats.org/officeDocument/2006/relationships" xmlns:p="http://schemas.openxmlformats.org/presentationml/2006/main" show="0">
-  <p:cSld>
-    <p:spTree>
-      <p:nvGrpSpPr>
-        <p:cNvPr id="1" name=""/>
-        <p:cNvGrpSpPr/>
-        <p:nvPr/>
-      </p:nvGrpSpPr>
-      <p:grpSpPr>
-        <a:xfrm>
-          <a:off x="0" y="0"/>
-          <a:ext cx="0" cy="0"/>
-          <a:chOff x="0" y="0"/>
-          <a:chExt cx="0" cy="0"/>
-        </a:xfrm>
-      </p:grpSpPr>
-      <p:sp>
-        <p:nvSpPr>
-          <p:cNvPr id="2" name="Titel 1">
-            <a:extLst>
-              <a:ext uri="{FF2B5EF4-FFF2-40B4-BE49-F238E27FC236}">
-                <a16:creationId xmlns:a16="http://schemas.microsoft.com/office/drawing/2014/main" id="{05C4717A-1870-E4D6-FCA4-863C9DDC93BF}"/>
-              </a:ext>
-            </a:extLst>
-          </p:cNvPr>
-          <p:cNvSpPr>
-            <a:spLocks noGrp="1"/>
-          </p:cNvSpPr>
-          <p:nvPr>
-            <p:ph type="title"/>
-          </p:nvPr>
-        </p:nvSpPr>
-        <p:spPr/>
-        <p:txBody>
-          <a:bodyPr/>
-          <a:lstStyle/>
-          <a:p>
-            <a:r>
-              <a:rPr lang="de-DE" dirty="0"/>
-              <a:t>Projekt -anforderungen</a:t>
-            </a:r>
-          </a:p>
-        </p:txBody>
-      </p:sp>
-      <p:sp>
-        <p:nvSpPr>
-          <p:cNvPr id="3" name="Inhaltsplatzhalter 2">
-            <a:extLst>
-              <a:ext uri="{FF2B5EF4-FFF2-40B4-BE49-F238E27FC236}">
-                <a16:creationId xmlns:a16="http://schemas.microsoft.com/office/drawing/2014/main" id="{B0619567-FF79-5E32-3EBC-D8049E62F16D}"/>
-              </a:ext>
-            </a:extLst>
-          </p:cNvPr>
-          <p:cNvSpPr>
-            <a:spLocks noGrp="1"/>
-          </p:cNvSpPr>
-          <p:nvPr>
-            <p:ph idx="1"/>
-          </p:nvPr>
-        </p:nvSpPr>
-        <p:spPr/>
-        <p:txBody>
-          <a:bodyPr>
-            <a:normAutofit/>
-          </a:bodyPr>
-          <a:lstStyle/>
-          <a:p>
-            <a:pPr marL="0" indent="0">
-              <a:buNone/>
-            </a:pPr>
-            <a:r>
-              <a:rPr lang="de-DE" sz="2800" dirty="0"/>
-              <a:t>Projekt: </a:t>
-            </a:r>
-            <a:r>
-              <a:rPr lang="de-DE" sz="2800" dirty="0" err="1"/>
-              <a:t>Todo</a:t>
-            </a:r>
-            <a:r>
-              <a:rPr lang="de-DE" sz="2800" dirty="0"/>
-              <a:t>-Liste in </a:t>
-            </a:r>
-            <a:r>
-              <a:rPr lang="de-DE" sz="2800" dirty="0" err="1"/>
-              <a:t>Lua</a:t>
-            </a:r>
-            <a:r>
-              <a:rPr lang="de-DE" sz="2800" dirty="0"/>
-              <a:t> und Go</a:t>
-            </a:r>
-          </a:p>
-          <a:p>
-            <a:pPr marL="0" indent="0">
-              <a:buNone/>
-            </a:pPr>
-            <a:endParaRPr lang="de-DE" sz="2800" dirty="0"/>
-          </a:p>
-          <a:p>
-            <a:r>
-              <a:rPr lang="de-DE" sz="2400" dirty="0"/>
-              <a:t>Kernfunktionen:  </a:t>
-            </a:r>
-          </a:p>
-          <a:p>
-            <a:pPr lvl="1"/>
-            <a:r>
-              <a:rPr lang="de-DE" sz="2200" dirty="0" err="1"/>
-              <a:t>Todos</a:t>
-            </a:r>
-            <a:r>
-              <a:rPr lang="de-DE" sz="2200" dirty="0"/>
-              <a:t> hinzufügen</a:t>
-            </a:r>
-          </a:p>
-          <a:p>
-            <a:pPr lvl="1"/>
-            <a:r>
-              <a:rPr lang="de-DE" sz="2200" dirty="0" err="1"/>
-              <a:t>Todos</a:t>
-            </a:r>
-            <a:r>
-              <a:rPr lang="de-DE" sz="2200" dirty="0"/>
-              <a:t> Löschen</a:t>
-            </a:r>
-          </a:p>
-          <a:p>
-            <a:pPr lvl="1"/>
-            <a:r>
-              <a:rPr lang="de-DE" sz="2200" dirty="0" err="1"/>
-              <a:t>Todos</a:t>
-            </a:r>
-            <a:r>
-              <a:rPr lang="de-DE" sz="2200" dirty="0"/>
-              <a:t> abhaken</a:t>
-            </a:r>
-          </a:p>
-          <a:p>
-            <a:pPr marL="502920" lvl="1" indent="0">
-              <a:buNone/>
-            </a:pPr>
-            <a:endParaRPr lang="de-DE" sz="2200" dirty="0"/>
-          </a:p>
-          <a:p>
-            <a:r>
-              <a:rPr lang="de-DE" sz="2400" dirty="0"/>
-              <a:t>Anforderungen:</a:t>
-            </a:r>
-          </a:p>
-          <a:p>
-            <a:pPr lvl="1"/>
-            <a:r>
-              <a:rPr lang="de-DE" sz="2200" dirty="0"/>
-              <a:t>Unit Tests</a:t>
-            </a:r>
-          </a:p>
-          <a:p>
-            <a:pPr lvl="1"/>
-            <a:r>
-              <a:rPr lang="de-DE" sz="2200" dirty="0"/>
-              <a:t>Error Handling</a:t>
-            </a:r>
-          </a:p>
-          <a:p>
-            <a:pPr lvl="1"/>
-            <a:r>
-              <a:rPr lang="de-DE" sz="2200" dirty="0"/>
-              <a:t>Konsistente Funktionalität in beiden Sprachen</a:t>
-            </a:r>
-          </a:p>
-          <a:p>
-            <a:endParaRPr lang="de-DE" sz="2600" dirty="0"/>
-          </a:p>
-        </p:txBody>
-      </p:sp>
-    </p:spTree>
-    <p:extLst>
-      <p:ext uri="{BB962C8B-B14F-4D97-AF65-F5344CB8AC3E}">
-        <p14:creationId xmlns:p14="http://schemas.microsoft.com/office/powerpoint/2010/main" val="800182422"/>
-      </p:ext>
-    </p:extLst>
-  </p:cSld>
-  <p:clrMapOvr>
-    <a:masterClrMapping/>
-  </p:clrMapOvr>
-</p:sld>
-</file>
-
-<file path=ppt/slides/slide12.xml><?xml version="1.0" encoding="utf-8"?>
 <p:sld xmlns:a="http://schemas.openxmlformats.org/drawingml/2006/main" xmlns:r="http://schemas.openxmlformats.org/officeDocument/2006/relationships" xmlns:p="http://schemas.openxmlformats.org/presentationml/2006/main">
   <p:cSld>
     <p:bg>
@@ -4523,6 +4724,35 @@
           </a:p>
         </p:txBody>
       </p:sp>
+      <p:sp>
+        <p:nvSpPr>
+          <p:cNvPr id="3" name="Foliennummernplatzhalter 2">
+            <a:extLst>
+              <a:ext uri="{FF2B5EF4-FFF2-40B4-BE49-F238E27FC236}">
+                <a16:creationId xmlns:a16="http://schemas.microsoft.com/office/drawing/2014/main" id="{D3214F72-4A52-9B64-A442-4E3A3E7C9AE8}"/>
+              </a:ext>
+            </a:extLst>
+          </p:cNvPr>
+          <p:cNvSpPr>
+            <a:spLocks noGrp="1"/>
+          </p:cNvSpPr>
+          <p:nvPr>
+            <p:ph type="sldNum" sz="quarter" idx="12"/>
+          </p:nvPr>
+        </p:nvSpPr>
+        <p:spPr/>
+        <p:txBody>
+          <a:bodyPr/>
+          <a:lstStyle/>
+          <a:p>
+            <a:fld id="{34F138AB-EE92-463A-901F-60A2CAACE736}" type="slidenum">
+              <a:rPr lang="de-DE" smtClean="0"/>
+              <a:t>11</a:t>
+            </a:fld>
+            <a:endParaRPr lang="de-DE"/>
+          </a:p>
+        </p:txBody>
+      </p:sp>
     </p:spTree>
     <p:extLst>
       <p:ext uri="{BB962C8B-B14F-4D97-AF65-F5344CB8AC3E}">
@@ -4536,7 +4766,7 @@
 </p:sld>
 </file>
 
-<file path=ppt/slides/slide13.xml><?xml version="1.0" encoding="utf-8"?>
+<file path=ppt/slides/slide12.xml><?xml version="1.0" encoding="utf-8"?>
 <p:sld xmlns:a="http://schemas.openxmlformats.org/drawingml/2006/main" xmlns:r="http://schemas.openxmlformats.org/officeDocument/2006/relationships" xmlns:p="http://schemas.openxmlformats.org/presentationml/2006/main">
   <p:cSld>
     <p:spTree>
@@ -4714,6 +4944,35 @@
           </a:p>
           <a:p>
             <a:endParaRPr lang="de-DE" dirty="0"/>
+          </a:p>
+        </p:txBody>
+      </p:sp>
+      <p:sp>
+        <p:nvSpPr>
+          <p:cNvPr id="4" name="Foliennummernplatzhalter 3">
+            <a:extLst>
+              <a:ext uri="{FF2B5EF4-FFF2-40B4-BE49-F238E27FC236}">
+                <a16:creationId xmlns:a16="http://schemas.microsoft.com/office/drawing/2014/main" id="{D3FB868F-0213-355B-3AB8-11678C117BBA}"/>
+              </a:ext>
+            </a:extLst>
+          </p:cNvPr>
+          <p:cNvSpPr>
+            <a:spLocks noGrp="1"/>
+          </p:cNvSpPr>
+          <p:nvPr>
+            <p:ph type="sldNum" sz="quarter" idx="12"/>
+          </p:nvPr>
+        </p:nvSpPr>
+        <p:spPr/>
+        <p:txBody>
+          <a:bodyPr/>
+          <a:lstStyle/>
+          <a:p>
+            <a:fld id="{34F138AB-EE92-463A-901F-60A2CAACE736}" type="slidenum">
+              <a:rPr lang="de-DE" smtClean="0"/>
+              <a:t>12</a:t>
+            </a:fld>
+            <a:endParaRPr lang="de-DE"/>
           </a:p>
         </p:txBody>
       </p:sp>
@@ -5130,6 +5389,35 @@
           </a:p>
         </p:txBody>
       </p:sp>
+      <p:sp>
+        <p:nvSpPr>
+          <p:cNvPr id="4" name="Foliennummernplatzhalter 3">
+            <a:extLst>
+              <a:ext uri="{FF2B5EF4-FFF2-40B4-BE49-F238E27FC236}">
+                <a16:creationId xmlns:a16="http://schemas.microsoft.com/office/drawing/2014/main" id="{79FB2838-EB84-69BE-ABF7-E608E7380AE4}"/>
+              </a:ext>
+            </a:extLst>
+          </p:cNvPr>
+          <p:cNvSpPr>
+            <a:spLocks noGrp="1"/>
+          </p:cNvSpPr>
+          <p:nvPr>
+            <p:ph type="sldNum" sz="quarter" idx="12"/>
+          </p:nvPr>
+        </p:nvSpPr>
+        <p:spPr/>
+        <p:txBody>
+          <a:bodyPr/>
+          <a:lstStyle/>
+          <a:p>
+            <a:fld id="{34F138AB-EE92-463A-901F-60A2CAACE736}" type="slidenum">
+              <a:rPr lang="de-DE" smtClean="0"/>
+              <a:t>2</a:t>
+            </a:fld>
+            <a:endParaRPr lang="de-DE"/>
+          </a:p>
+        </p:txBody>
+      </p:sp>
     </p:spTree>
     <p:extLst>
       <p:ext uri="{BB962C8B-B14F-4D97-AF65-F5344CB8AC3E}">
@@ -5359,6 +5647,35 @@
                 <a:srgbClr val="FFFFFF"/>
               </a:solidFill>
             </a:endParaRPr>
+          </a:p>
+        </p:txBody>
+      </p:sp>
+      <p:sp>
+        <p:nvSpPr>
+          <p:cNvPr id="3" name="Foliennummernplatzhalter 2">
+            <a:extLst>
+              <a:ext uri="{FF2B5EF4-FFF2-40B4-BE49-F238E27FC236}">
+                <a16:creationId xmlns:a16="http://schemas.microsoft.com/office/drawing/2014/main" id="{4230A267-E06E-B76A-89A7-E54469AB51BC}"/>
+              </a:ext>
+            </a:extLst>
+          </p:cNvPr>
+          <p:cNvSpPr>
+            <a:spLocks noGrp="1"/>
+          </p:cNvSpPr>
+          <p:nvPr>
+            <p:ph type="sldNum" sz="quarter" idx="12"/>
+          </p:nvPr>
+        </p:nvSpPr>
+        <p:spPr/>
+        <p:txBody>
+          <a:bodyPr/>
+          <a:lstStyle/>
+          <a:p>
+            <a:fld id="{34F138AB-EE92-463A-901F-60A2CAACE736}" type="slidenum">
+              <a:rPr lang="de-DE" smtClean="0"/>
+              <a:t>3</a:t>
+            </a:fld>
+            <a:endParaRPr lang="de-DE"/>
           </a:p>
         </p:txBody>
       </p:sp>
@@ -5746,6 +6063,35 @@
           </a:p>
         </p:txBody>
       </p:sp>
+      <p:sp>
+        <p:nvSpPr>
+          <p:cNvPr id="4" name="Foliennummernplatzhalter 3">
+            <a:extLst>
+              <a:ext uri="{FF2B5EF4-FFF2-40B4-BE49-F238E27FC236}">
+                <a16:creationId xmlns:a16="http://schemas.microsoft.com/office/drawing/2014/main" id="{40D69568-CD30-5AB9-A6C7-B756FDAD9AC2}"/>
+              </a:ext>
+            </a:extLst>
+          </p:cNvPr>
+          <p:cNvSpPr>
+            <a:spLocks noGrp="1"/>
+          </p:cNvSpPr>
+          <p:nvPr>
+            <p:ph type="sldNum" sz="quarter" idx="12"/>
+          </p:nvPr>
+        </p:nvSpPr>
+        <p:spPr/>
+        <p:txBody>
+          <a:bodyPr/>
+          <a:lstStyle/>
+          <a:p>
+            <a:fld id="{34F138AB-EE92-463A-901F-60A2CAACE736}" type="slidenum">
+              <a:rPr lang="de-DE" smtClean="0"/>
+              <a:t>4</a:t>
+            </a:fld>
+            <a:endParaRPr lang="de-DE"/>
+          </a:p>
+        </p:txBody>
+      </p:sp>
     </p:spTree>
     <p:extLst>
       <p:ext uri="{BB962C8B-B14F-4D97-AF65-F5344CB8AC3E}">
@@ -5872,13 +6218,6 @@
             </a:r>
           </a:p>
           <a:p>
-            <a:pPr lvl="1"/>
-            <a:r>
-              <a:rPr lang="de-DE" sz="2400" dirty="0"/>
-              <a:t>Konstruktoren sind oft nicht nötig</a:t>
-            </a:r>
-          </a:p>
-          <a:p>
             <a:endParaRPr lang="de-DE" sz="2800" dirty="0"/>
           </a:p>
           <a:p>
@@ -5912,15 +6251,39 @@
             </a:r>
           </a:p>
           <a:p>
-            <a:pPr lvl="1"/>
-            <a:r>
-              <a:rPr lang="de-DE" sz="2400" dirty="0"/>
-              <a:t>Konstruktoren müssen definiert werden</a:t>
-            </a:r>
-          </a:p>
-          <a:p>
-            <a:pPr lvl="1"/>
+            <a:pPr marL="502920" lvl="1" indent="0">
+              <a:buNone/>
+            </a:pPr>
             <a:endParaRPr lang="de-DE" dirty="0"/>
+          </a:p>
+        </p:txBody>
+      </p:sp>
+      <p:sp>
+        <p:nvSpPr>
+          <p:cNvPr id="4" name="Foliennummernplatzhalter 3">
+            <a:extLst>
+              <a:ext uri="{FF2B5EF4-FFF2-40B4-BE49-F238E27FC236}">
+                <a16:creationId xmlns:a16="http://schemas.microsoft.com/office/drawing/2014/main" id="{6F351D24-1F8E-FE47-4A46-2656FD27B6B6}"/>
+              </a:ext>
+            </a:extLst>
+          </p:cNvPr>
+          <p:cNvSpPr>
+            <a:spLocks noGrp="1"/>
+          </p:cNvSpPr>
+          <p:nvPr>
+            <p:ph type="sldNum" sz="quarter" idx="12"/>
+          </p:nvPr>
+        </p:nvSpPr>
+        <p:spPr/>
+        <p:txBody>
+          <a:bodyPr/>
+          <a:lstStyle/>
+          <a:p>
+            <a:fld id="{34F138AB-EE92-463A-901F-60A2CAACE736}" type="slidenum">
+              <a:rPr lang="de-DE" smtClean="0"/>
+              <a:t>5</a:t>
+            </a:fld>
+            <a:endParaRPr lang="de-DE"/>
           </a:p>
         </p:txBody>
       </p:sp>
@@ -6403,6 +6766,35 @@
           </a:p>
         </p:txBody>
       </p:sp>
+      <p:sp>
+        <p:nvSpPr>
+          <p:cNvPr id="5" name="Foliennummernplatzhalter 4">
+            <a:extLst>
+              <a:ext uri="{FF2B5EF4-FFF2-40B4-BE49-F238E27FC236}">
+                <a16:creationId xmlns:a16="http://schemas.microsoft.com/office/drawing/2014/main" id="{24D7BE0E-FFE7-EC95-B638-F48AD807AA4E}"/>
+              </a:ext>
+            </a:extLst>
+          </p:cNvPr>
+          <p:cNvSpPr>
+            <a:spLocks noGrp="1"/>
+          </p:cNvSpPr>
+          <p:nvPr>
+            <p:ph type="sldNum" sz="quarter" idx="12"/>
+          </p:nvPr>
+        </p:nvSpPr>
+        <p:spPr/>
+        <p:txBody>
+          <a:bodyPr/>
+          <a:lstStyle/>
+          <a:p>
+            <a:fld id="{34F138AB-EE92-463A-901F-60A2CAACE736}" type="slidenum">
+              <a:rPr lang="de-DE" smtClean="0"/>
+              <a:t>6</a:t>
+            </a:fld>
+            <a:endParaRPr lang="de-DE"/>
+          </a:p>
+        </p:txBody>
+      </p:sp>
     </p:spTree>
     <p:extLst>
       <p:ext uri="{BB962C8B-B14F-4D97-AF65-F5344CB8AC3E}">
@@ -6811,6 +7203,35 @@
           </a:prstGeom>
         </p:spPr>
       </p:pic>
+      <p:sp>
+        <p:nvSpPr>
+          <p:cNvPr id="4" name="Foliennummernplatzhalter 3">
+            <a:extLst>
+              <a:ext uri="{FF2B5EF4-FFF2-40B4-BE49-F238E27FC236}">
+                <a16:creationId xmlns:a16="http://schemas.microsoft.com/office/drawing/2014/main" id="{6CB75F8C-EAAD-0427-EB59-EC0F267A2C55}"/>
+              </a:ext>
+            </a:extLst>
+          </p:cNvPr>
+          <p:cNvSpPr>
+            <a:spLocks noGrp="1"/>
+          </p:cNvSpPr>
+          <p:nvPr>
+            <p:ph type="sldNum" sz="quarter" idx="12"/>
+          </p:nvPr>
+        </p:nvSpPr>
+        <p:spPr/>
+        <p:txBody>
+          <a:bodyPr/>
+          <a:lstStyle/>
+          <a:p>
+            <a:fld id="{34F138AB-EE92-463A-901F-60A2CAACE736}" type="slidenum">
+              <a:rPr lang="de-DE" smtClean="0"/>
+              <a:t>7</a:t>
+            </a:fld>
+            <a:endParaRPr lang="de-DE"/>
+          </a:p>
+        </p:txBody>
+      </p:sp>
     </p:spTree>
     <p:extLst>
       <p:ext uri="{BB962C8B-B14F-4D97-AF65-F5344CB8AC3E}">
@@ -7471,23 +7892,7 @@
                   <a:srgbClr val="FFFFFF"/>
                 </a:solidFill>
               </a:rPr>
-              <a:t>One-Way-</a:t>
-            </a:r>
-            <a:r>
-              <a:rPr lang="en-US" sz="1800" dirty="0" err="1">
-                <a:solidFill>
-                  <a:srgbClr val="FFFFFF"/>
-                </a:solidFill>
-              </a:rPr>
-              <a:t>Vererbung</a:t>
-            </a:r>
-            <a:r>
-              <a:rPr lang="en-US" sz="1800" dirty="0">
-                <a:solidFill>
-                  <a:srgbClr val="FFFFFF"/>
-                </a:solidFill>
-              </a:rPr>
-              <a:t>: Employee </a:t>
+              <a:t>Employee </a:t>
             </a:r>
             <a:r>
               <a:rPr lang="en-US" sz="1800" dirty="0" err="1">
@@ -8224,6 +8629,35 @@
           </a:lstStyle>
           <a:p>
             <a:endParaRPr lang="de-DE" dirty="0"/>
+          </a:p>
+        </p:txBody>
+      </p:sp>
+      <p:sp>
+        <p:nvSpPr>
+          <p:cNvPr id="3" name="Foliennummernplatzhalter 2">
+            <a:extLst>
+              <a:ext uri="{FF2B5EF4-FFF2-40B4-BE49-F238E27FC236}">
+                <a16:creationId xmlns:a16="http://schemas.microsoft.com/office/drawing/2014/main" id="{694B7C61-37FB-0875-DE5D-9A0C339CA35C}"/>
+              </a:ext>
+            </a:extLst>
+          </p:cNvPr>
+          <p:cNvSpPr>
+            <a:spLocks noGrp="1"/>
+          </p:cNvSpPr>
+          <p:nvPr>
+            <p:ph type="sldNum" sz="quarter" idx="12"/>
+          </p:nvPr>
+        </p:nvSpPr>
+        <p:spPr/>
+        <p:txBody>
+          <a:bodyPr/>
+          <a:lstStyle/>
+          <a:p>
+            <a:fld id="{34F138AB-EE92-463A-901F-60A2CAACE736}" type="slidenum">
+              <a:rPr lang="de-DE" smtClean="0"/>
+              <a:t>8</a:t>
+            </a:fld>
+            <a:endParaRPr lang="de-DE"/>
           </a:p>
         </p:txBody>
       </p:sp>
@@ -8508,20 +8942,12 @@
               </a:buClr>
             </a:pPr>
             <a:r>
-              <a:rPr lang="de-DE" sz="1600" dirty="0" err="1">
+              <a:rPr lang="de-DE" sz="1600" dirty="0">
                 <a:solidFill>
                   <a:srgbClr val="FFFFFF"/>
                 </a:solidFill>
               </a:rPr>
-              <a:t>Two</a:t>
-            </a:r>
-            <a:r>
-              <a:rPr lang="de-DE" sz="1600" dirty="0">
-                <a:solidFill>
-                  <a:srgbClr val="FFFFFF"/>
-                </a:solidFill>
-              </a:rPr>
-              <a:t>-Way-Vererbung: Methoden der Basisklasse können immer Felder der Kindklasse zugreifen und umgekehrt</a:t>
+              <a:t>Methoden der Basisklasse können immer Felder der Kindklasse zugreifen und umgekehrt</a:t>
             </a:r>
           </a:p>
           <a:p>
@@ -8666,6 +9092,35 @@
           </a:prstGeom>
         </p:spPr>
       </p:pic>
+      <p:sp>
+        <p:nvSpPr>
+          <p:cNvPr id="4" name="Foliennummernplatzhalter 3">
+            <a:extLst>
+              <a:ext uri="{FF2B5EF4-FFF2-40B4-BE49-F238E27FC236}">
+                <a16:creationId xmlns:a16="http://schemas.microsoft.com/office/drawing/2014/main" id="{9F9E23F8-7C04-0C70-3564-CB4D157E6B5B}"/>
+              </a:ext>
+            </a:extLst>
+          </p:cNvPr>
+          <p:cNvSpPr>
+            <a:spLocks noGrp="1"/>
+          </p:cNvSpPr>
+          <p:nvPr>
+            <p:ph type="sldNum" sz="quarter" idx="12"/>
+          </p:nvPr>
+        </p:nvSpPr>
+        <p:spPr/>
+        <p:txBody>
+          <a:bodyPr/>
+          <a:lstStyle/>
+          <a:p>
+            <a:fld id="{34F138AB-EE92-463A-901F-60A2CAACE736}" type="slidenum">
+              <a:rPr lang="de-DE" smtClean="0"/>
+              <a:t>9</a:t>
+            </a:fld>
+            <a:endParaRPr lang="de-DE"/>
+          </a:p>
+        </p:txBody>
+      </p:sp>
     </p:spTree>
     <p:extLst>
       <p:ext uri="{BB962C8B-B14F-4D97-AF65-F5344CB8AC3E}">
@@ -8908,4 +9363,319 @@
     </a:ext>
   </a:extLst>
 </a:theme>
+</file>
+
+<file path=ppt/theme/theme2.xml><?xml version="1.0" encoding="utf-8"?>
+<a:theme xmlns:a="http://schemas.openxmlformats.org/drawingml/2006/main" name="Office">
+  <a:themeElements>
+    <a:clrScheme name="Office">
+      <a:dk1>
+        <a:sysClr val="windowText" lastClr="000000"/>
+      </a:dk1>
+      <a:lt1>
+        <a:sysClr val="window" lastClr="FFFFFF"/>
+      </a:lt1>
+      <a:dk2>
+        <a:srgbClr val="0E2841"/>
+      </a:dk2>
+      <a:lt2>
+        <a:srgbClr val="E8E8E8"/>
+      </a:lt2>
+      <a:accent1>
+        <a:srgbClr val="156082"/>
+      </a:accent1>
+      <a:accent2>
+        <a:srgbClr val="E97132"/>
+      </a:accent2>
+      <a:accent3>
+        <a:srgbClr val="196B24"/>
+      </a:accent3>
+      <a:accent4>
+        <a:srgbClr val="0F9ED5"/>
+      </a:accent4>
+      <a:accent5>
+        <a:srgbClr val="A02B93"/>
+      </a:accent5>
+      <a:accent6>
+        <a:srgbClr val="4EA72E"/>
+      </a:accent6>
+      <a:hlink>
+        <a:srgbClr val="467886"/>
+      </a:hlink>
+      <a:folHlink>
+        <a:srgbClr val="96607D"/>
+      </a:folHlink>
+    </a:clrScheme>
+    <a:fontScheme name="Office">
+      <a:majorFont>
+        <a:latin typeface="Aptos Display" panose="02110004020202020204"/>
+        <a:ea typeface=""/>
+        <a:cs typeface=""/>
+        <a:font script="Jpan" typeface="游ゴシック Light"/>
+        <a:font script="Hang" typeface="맑은 고딕"/>
+        <a:font script="Hans" typeface="等线 Light"/>
+        <a:font script="Hant" typeface="新細明體"/>
+        <a:font script="Arab" typeface="Times New Roman"/>
+        <a:font script="Hebr" typeface="Times New Roman"/>
+        <a:font script="Thai" typeface="Angsana New"/>
+        <a:font script="Ethi" typeface="Nyala"/>
+        <a:font script="Beng" typeface="Vrinda"/>
+        <a:font script="Gujr" typeface="Shruti"/>
+        <a:font script="Khmr" typeface="MoolBoran"/>
+        <a:font script="Knda" typeface="Tunga"/>
+        <a:font script="Guru" typeface="Raavi"/>
+        <a:font script="Cans" typeface="Euphemia"/>
+        <a:font script="Cher" typeface="Plantagenet Cherokee"/>
+        <a:font script="Yiii" typeface="Microsoft Yi Baiti"/>
+        <a:font script="Tibt" typeface="Microsoft Himalaya"/>
+        <a:font script="Thaa" typeface="MV Boli"/>
+        <a:font script="Deva" typeface="Mangal"/>
+        <a:font script="Telu" typeface="Gautami"/>
+        <a:font script="Taml" typeface="Latha"/>
+        <a:font script="Syrc" typeface="Estrangelo Edessa"/>
+        <a:font script="Orya" typeface="Kalinga"/>
+        <a:font script="Mlym" typeface="Kartika"/>
+        <a:font script="Laoo" typeface="DokChampa"/>
+        <a:font script="Sinh" typeface="Iskoola Pota"/>
+        <a:font script="Mong" typeface="Mongolian Baiti"/>
+        <a:font script="Viet" typeface="Times New Roman"/>
+        <a:font script="Uigh" typeface="Microsoft Uighur"/>
+        <a:font script="Geor" typeface="Sylfaen"/>
+        <a:font script="Armn" typeface="Arial"/>
+        <a:font script="Bugi" typeface="Leelawadee UI"/>
+        <a:font script="Bopo" typeface="Microsoft JhengHei"/>
+        <a:font script="Java" typeface="Javanese Text"/>
+        <a:font script="Lisu" typeface="Segoe UI"/>
+        <a:font script="Mymr" typeface="Myanmar Text"/>
+        <a:font script="Nkoo" typeface="Ebrima"/>
+        <a:font script="Olck" typeface="Nirmala UI"/>
+        <a:font script="Osma" typeface="Ebrima"/>
+        <a:font script="Phag" typeface="Phagspa"/>
+        <a:font script="Syrn" typeface="Estrangelo Edessa"/>
+        <a:font script="Syrj" typeface="Estrangelo Edessa"/>
+        <a:font script="Syre" typeface="Estrangelo Edessa"/>
+        <a:font script="Sora" typeface="Nirmala UI"/>
+        <a:font script="Tale" typeface="Microsoft Tai Le"/>
+        <a:font script="Talu" typeface="Microsoft New Tai Lue"/>
+        <a:font script="Tfng" typeface="Ebrima"/>
+      </a:majorFont>
+      <a:minorFont>
+        <a:latin typeface="Aptos" panose="02110004020202020204"/>
+        <a:ea typeface=""/>
+        <a:cs typeface=""/>
+        <a:font script="Jpan" typeface="游ゴシック"/>
+        <a:font script="Hang" typeface="맑은 고딕"/>
+        <a:font script="Hans" typeface="等线"/>
+        <a:font script="Hant" typeface="新細明體"/>
+        <a:font script="Arab" typeface="Arial"/>
+        <a:font script="Hebr" typeface="Arial"/>
+        <a:font script="Thai" typeface="Cordia New"/>
+        <a:font script="Ethi" typeface="Nyala"/>
+        <a:font script="Beng" typeface="Vrinda"/>
+        <a:font script="Gujr" typeface="Shruti"/>
+        <a:font script="Khmr" typeface="DaunPenh"/>
+        <a:font script="Knda" typeface="Tunga"/>
+        <a:font script="Guru" typeface="Raavi"/>
+        <a:font script="Cans" typeface="Euphemia"/>
+        <a:font script="Cher" typeface="Plantagenet Cherokee"/>
+        <a:font script="Yiii" typeface="Microsoft Yi Baiti"/>
+        <a:font script="Tibt" typeface="Microsoft Himalaya"/>
+        <a:font script="Thaa" typeface="MV Boli"/>
+        <a:font script="Deva" typeface="Mangal"/>
+        <a:font script="Telu" typeface="Gautami"/>
+        <a:font script="Taml" typeface="Latha"/>
+        <a:font script="Syrc" typeface="Estrangelo Edessa"/>
+        <a:font script="Orya" typeface="Kalinga"/>
+        <a:font script="Mlym" typeface="Kartika"/>
+        <a:font script="Laoo" typeface="DokChampa"/>
+        <a:font script="Sinh" typeface="Iskoola Pota"/>
+        <a:font script="Mong" typeface="Mongolian Baiti"/>
+        <a:font script="Viet" typeface="Arial"/>
+        <a:font script="Uigh" typeface="Microsoft Uighur"/>
+        <a:font script="Geor" typeface="Sylfaen"/>
+        <a:font script="Armn" typeface="Arial"/>
+        <a:font script="Bugi" typeface="Leelawadee UI"/>
+        <a:font script="Bopo" typeface="Microsoft JhengHei"/>
+        <a:font script="Java" typeface="Javanese Text"/>
+        <a:font script="Lisu" typeface="Segoe UI"/>
+        <a:font script="Mymr" typeface="Myanmar Text"/>
+        <a:font script="Nkoo" typeface="Ebrima"/>
+        <a:font script="Olck" typeface="Nirmala UI"/>
+        <a:font script="Osma" typeface="Ebrima"/>
+        <a:font script="Phag" typeface="Phagspa"/>
+        <a:font script="Syrn" typeface="Estrangelo Edessa"/>
+        <a:font script="Syrj" typeface="Estrangelo Edessa"/>
+        <a:font script="Syre" typeface="Estrangelo Edessa"/>
+        <a:font script="Sora" typeface="Nirmala UI"/>
+        <a:font script="Tale" typeface="Microsoft Tai Le"/>
+        <a:font script="Talu" typeface="Microsoft New Tai Lue"/>
+        <a:font script="Tfng" typeface="Ebrima"/>
+      </a:minorFont>
+    </a:fontScheme>
+    <a:fmtScheme name="Office">
+      <a:fillStyleLst>
+        <a:solidFill>
+          <a:schemeClr val="phClr"/>
+        </a:solidFill>
+        <a:gradFill rotWithShape="1">
+          <a:gsLst>
+            <a:gs pos="0">
+              <a:schemeClr val="phClr">
+                <a:lumMod val="110000"/>
+                <a:satMod val="105000"/>
+                <a:tint val="67000"/>
+              </a:schemeClr>
+            </a:gs>
+            <a:gs pos="50000">
+              <a:schemeClr val="phClr">
+                <a:lumMod val="105000"/>
+                <a:satMod val="103000"/>
+                <a:tint val="73000"/>
+              </a:schemeClr>
+            </a:gs>
+            <a:gs pos="100000">
+              <a:schemeClr val="phClr">
+                <a:lumMod val="105000"/>
+                <a:satMod val="109000"/>
+                <a:tint val="81000"/>
+              </a:schemeClr>
+            </a:gs>
+          </a:gsLst>
+          <a:lin ang="5400000" scaled="0"/>
+        </a:gradFill>
+        <a:gradFill rotWithShape="1">
+          <a:gsLst>
+            <a:gs pos="0">
+              <a:schemeClr val="phClr">
+                <a:satMod val="103000"/>
+                <a:lumMod val="102000"/>
+                <a:tint val="94000"/>
+              </a:schemeClr>
+            </a:gs>
+            <a:gs pos="50000">
+              <a:schemeClr val="phClr">
+                <a:satMod val="110000"/>
+                <a:lumMod val="100000"/>
+                <a:shade val="100000"/>
+              </a:schemeClr>
+            </a:gs>
+            <a:gs pos="100000">
+              <a:schemeClr val="phClr">
+                <a:lumMod val="99000"/>
+                <a:satMod val="120000"/>
+                <a:shade val="78000"/>
+              </a:schemeClr>
+            </a:gs>
+          </a:gsLst>
+          <a:lin ang="5400000" scaled="0"/>
+        </a:gradFill>
+      </a:fillStyleLst>
+      <a:lnStyleLst>
+        <a:ln w="12700" cap="flat" cmpd="sng" algn="ctr">
+          <a:solidFill>
+            <a:schemeClr val="phClr"/>
+          </a:solidFill>
+          <a:prstDash val="solid"/>
+          <a:miter lim="800000"/>
+        </a:ln>
+        <a:ln w="19050" cap="flat" cmpd="sng" algn="ctr">
+          <a:solidFill>
+            <a:schemeClr val="phClr"/>
+          </a:solidFill>
+          <a:prstDash val="solid"/>
+          <a:miter lim="800000"/>
+        </a:ln>
+        <a:ln w="25400" cap="flat" cmpd="sng" algn="ctr">
+          <a:solidFill>
+            <a:schemeClr val="phClr"/>
+          </a:solidFill>
+          <a:prstDash val="solid"/>
+          <a:miter lim="800000"/>
+        </a:ln>
+      </a:lnStyleLst>
+      <a:effectStyleLst>
+        <a:effectStyle>
+          <a:effectLst/>
+        </a:effectStyle>
+        <a:effectStyle>
+          <a:effectLst/>
+        </a:effectStyle>
+        <a:effectStyle>
+          <a:effectLst>
+            <a:outerShdw blurRad="57150" dist="19050" dir="5400000" algn="ctr" rotWithShape="0">
+              <a:srgbClr val="000000">
+                <a:alpha val="63000"/>
+              </a:srgbClr>
+            </a:outerShdw>
+          </a:effectLst>
+        </a:effectStyle>
+      </a:effectStyleLst>
+      <a:bgFillStyleLst>
+        <a:solidFill>
+          <a:schemeClr val="phClr"/>
+        </a:solidFill>
+        <a:solidFill>
+          <a:schemeClr val="phClr">
+            <a:tint val="95000"/>
+            <a:satMod val="170000"/>
+          </a:schemeClr>
+        </a:solidFill>
+        <a:gradFill rotWithShape="1">
+          <a:gsLst>
+            <a:gs pos="0">
+              <a:schemeClr val="phClr">
+                <a:tint val="93000"/>
+                <a:satMod val="150000"/>
+                <a:shade val="98000"/>
+                <a:lumMod val="102000"/>
+              </a:schemeClr>
+            </a:gs>
+            <a:gs pos="50000">
+              <a:schemeClr val="phClr">
+                <a:tint val="98000"/>
+                <a:satMod val="130000"/>
+                <a:shade val="90000"/>
+                <a:lumMod val="103000"/>
+              </a:schemeClr>
+            </a:gs>
+            <a:gs pos="100000">
+              <a:schemeClr val="phClr">
+                <a:shade val="63000"/>
+                <a:satMod val="120000"/>
+              </a:schemeClr>
+            </a:gs>
+          </a:gsLst>
+          <a:lin ang="5400000" scaled="0"/>
+        </a:gradFill>
+      </a:bgFillStyleLst>
+    </a:fmtScheme>
+  </a:themeElements>
+  <a:objectDefaults>
+    <a:lnDef>
+      <a:spPr/>
+      <a:bodyPr/>
+      <a:lstStyle/>
+      <a:style>
+        <a:lnRef idx="2">
+          <a:schemeClr val="accent1"/>
+        </a:lnRef>
+        <a:fillRef idx="0">
+          <a:schemeClr val="accent1"/>
+        </a:fillRef>
+        <a:effectRef idx="1">
+          <a:schemeClr val="accent1"/>
+        </a:effectRef>
+        <a:fontRef idx="minor">
+          <a:schemeClr val="tx1"/>
+        </a:fontRef>
+      </a:style>
+    </a:lnDef>
+  </a:objectDefaults>
+  <a:extraClrSchemeLst/>
+  <a:extLst>
+    <a:ext uri="{05A4C25C-085E-4340-85A3-A5531E510DB2}">
+      <thm15:themeFamily xmlns:thm15="http://schemas.microsoft.com/office/thememl/2012/main" name="Office Theme" id="{2E142A2C-CD16-42D6-873A-C26D2A0506FA}" vid="{1BDDFF52-6CD6-40A5-AB3C-68EB2F1E4D0A}"/>
+    </a:ext>
+  </a:extLst>
+</a:theme>
 </file>
</xml_diff>